<commit_message>
reviewed Presentation, added android build
</commit_message>
<xml_diff>
--- a/Documents/10_Frameworks_Presentation.pptx
+++ b/Documents/10_Frameworks_Presentation.pptx
@@ -233,7 +233,7 @@
           <a:p>
             <a:fld id="{8E3776DB-D0D7-49CC-A746-59C36186F7D2}" type="datetimeFigureOut">
               <a:rPr lang="de-CH" smtClean="0"/>
-              <a:t>04.01.2013</a:t>
+              <a:t>07.01.2013</a:t>
             </a:fld>
             <a:endParaRPr lang="de-CH"/>
           </a:p>
@@ -392,7 +392,7 @@
           <a:p>
             <a:fld id="{6FBD71ED-0134-410C-9AE3-EE654E5179DA}" type="slidenum">
               <a:rPr lang="de-CH" smtClean="0"/>
-              <a:t>‹Nr.›</a:t>
+              <a:t>‹#›</a:t>
             </a:fld>
             <a:endParaRPr lang="de-CH"/>
           </a:p>
@@ -1487,7 +1487,7 @@
           <a:p>
             <a:fld id="{1BA50D42-C9CD-4801-B293-61D1F53EC57E}" type="datetimeFigureOut">
               <a:rPr lang="de-DE" smtClean="0"/>
-              <a:t>04.01.2013</a:t>
+              <a:t>07.01.2013</a:t>
             </a:fld>
             <a:endParaRPr lang="de-DE"/>
           </a:p>
@@ -1529,7 +1529,7 @@
           <a:p>
             <a:fld id="{6C6AE60A-B69C-4790-82F7-3882EDF23186}" type="slidenum">
               <a:rPr lang="de-DE" smtClean="0"/>
-              <a:t>‹Nr.›</a:t>
+              <a:t>‹#›</a:t>
             </a:fld>
             <a:endParaRPr lang="de-DE"/>
           </a:p>
@@ -1652,7 +1652,7 @@
           <a:p>
             <a:fld id="{1BA50D42-C9CD-4801-B293-61D1F53EC57E}" type="datetimeFigureOut">
               <a:rPr lang="de-DE" smtClean="0"/>
-              <a:t>04.01.2013</a:t>
+              <a:t>07.01.2013</a:t>
             </a:fld>
             <a:endParaRPr lang="de-DE"/>
           </a:p>
@@ -1694,7 +1694,7 @@
           <a:p>
             <a:fld id="{6C6AE60A-B69C-4790-82F7-3882EDF23186}" type="slidenum">
               <a:rPr lang="de-DE" smtClean="0"/>
-              <a:t>‹Nr.›</a:t>
+              <a:t>‹#›</a:t>
             </a:fld>
             <a:endParaRPr lang="de-DE"/>
           </a:p>
@@ -1827,7 +1827,7 @@
           <a:p>
             <a:fld id="{1BA50D42-C9CD-4801-B293-61D1F53EC57E}" type="datetimeFigureOut">
               <a:rPr lang="de-DE" smtClean="0"/>
-              <a:t>04.01.2013</a:t>
+              <a:t>07.01.2013</a:t>
             </a:fld>
             <a:endParaRPr lang="de-DE"/>
           </a:p>
@@ -1869,7 +1869,7 @@
           <a:p>
             <a:fld id="{6C6AE60A-B69C-4790-82F7-3882EDF23186}" type="slidenum">
               <a:rPr lang="de-DE" smtClean="0"/>
-              <a:t>‹Nr.›</a:t>
+              <a:t>‹#›</a:t>
             </a:fld>
             <a:endParaRPr lang="de-DE"/>
           </a:p>
@@ -1992,7 +1992,7 @@
           <a:p>
             <a:fld id="{1BA50D42-C9CD-4801-B293-61D1F53EC57E}" type="datetimeFigureOut">
               <a:rPr lang="de-DE" smtClean="0"/>
-              <a:t>04.01.2013</a:t>
+              <a:t>07.01.2013</a:t>
             </a:fld>
             <a:endParaRPr lang="de-DE"/>
           </a:p>
@@ -2034,7 +2034,7 @@
           <a:p>
             <a:fld id="{6C6AE60A-B69C-4790-82F7-3882EDF23186}" type="slidenum">
               <a:rPr lang="de-DE" smtClean="0"/>
-              <a:t>‹Nr.›</a:t>
+              <a:t>‹#›</a:t>
             </a:fld>
             <a:endParaRPr lang="de-DE"/>
           </a:p>
@@ -2233,7 +2233,7 @@
           <a:p>
             <a:fld id="{1BA50D42-C9CD-4801-B293-61D1F53EC57E}" type="datetimeFigureOut">
               <a:rPr lang="de-DE" smtClean="0"/>
-              <a:t>04.01.2013</a:t>
+              <a:t>07.01.2013</a:t>
             </a:fld>
             <a:endParaRPr lang="de-DE"/>
           </a:p>
@@ -2275,7 +2275,7 @@
           <a:p>
             <a:fld id="{6C6AE60A-B69C-4790-82F7-3882EDF23186}" type="slidenum">
               <a:rPr lang="de-DE" smtClean="0"/>
-              <a:t>‹Nr.›</a:t>
+              <a:t>‹#›</a:t>
             </a:fld>
             <a:endParaRPr lang="de-DE"/>
           </a:p>
@@ -2516,7 +2516,7 @@
           <a:p>
             <a:fld id="{1BA50D42-C9CD-4801-B293-61D1F53EC57E}" type="datetimeFigureOut">
               <a:rPr lang="de-DE" smtClean="0"/>
-              <a:t>04.01.2013</a:t>
+              <a:t>07.01.2013</a:t>
             </a:fld>
             <a:endParaRPr lang="de-DE"/>
           </a:p>
@@ -2558,7 +2558,7 @@
           <a:p>
             <a:fld id="{6C6AE60A-B69C-4790-82F7-3882EDF23186}" type="slidenum">
               <a:rPr lang="de-DE" smtClean="0"/>
-              <a:t>‹Nr.›</a:t>
+              <a:t>‹#›</a:t>
             </a:fld>
             <a:endParaRPr lang="de-DE"/>
           </a:p>
@@ -2933,7 +2933,7 @@
           <a:p>
             <a:fld id="{1BA50D42-C9CD-4801-B293-61D1F53EC57E}" type="datetimeFigureOut">
               <a:rPr lang="de-DE" smtClean="0"/>
-              <a:t>04.01.2013</a:t>
+              <a:t>07.01.2013</a:t>
             </a:fld>
             <a:endParaRPr lang="de-DE"/>
           </a:p>
@@ -2975,7 +2975,7 @@
           <a:p>
             <a:fld id="{6C6AE60A-B69C-4790-82F7-3882EDF23186}" type="slidenum">
               <a:rPr lang="de-DE" smtClean="0"/>
-              <a:t>‹Nr.›</a:t>
+              <a:t>‹#›</a:t>
             </a:fld>
             <a:endParaRPr lang="de-DE"/>
           </a:p>
@@ -3046,7 +3046,7 @@
           <a:p>
             <a:fld id="{1BA50D42-C9CD-4801-B293-61D1F53EC57E}" type="datetimeFigureOut">
               <a:rPr lang="de-DE" smtClean="0"/>
-              <a:t>04.01.2013</a:t>
+              <a:t>07.01.2013</a:t>
             </a:fld>
             <a:endParaRPr lang="de-DE"/>
           </a:p>
@@ -3088,7 +3088,7 @@
           <a:p>
             <a:fld id="{6C6AE60A-B69C-4790-82F7-3882EDF23186}" type="slidenum">
               <a:rPr lang="de-DE" smtClean="0"/>
-              <a:t>‹Nr.›</a:t>
+              <a:t>‹#›</a:t>
             </a:fld>
             <a:endParaRPr lang="de-DE"/>
           </a:p>
@@ -3136,7 +3136,7 @@
           <a:p>
             <a:fld id="{1BA50D42-C9CD-4801-B293-61D1F53EC57E}" type="datetimeFigureOut">
               <a:rPr lang="de-DE" smtClean="0"/>
-              <a:t>04.01.2013</a:t>
+              <a:t>07.01.2013</a:t>
             </a:fld>
             <a:endParaRPr lang="de-DE"/>
           </a:p>
@@ -3178,7 +3178,7 @@
           <a:p>
             <a:fld id="{6C6AE60A-B69C-4790-82F7-3882EDF23186}" type="slidenum">
               <a:rPr lang="de-DE" smtClean="0"/>
-              <a:t>‹Nr.›</a:t>
+              <a:t>‹#›</a:t>
             </a:fld>
             <a:endParaRPr lang="de-DE"/>
           </a:p>
@@ -3408,7 +3408,7 @@
           <a:p>
             <a:fld id="{1BA50D42-C9CD-4801-B293-61D1F53EC57E}" type="datetimeFigureOut">
               <a:rPr lang="de-DE" smtClean="0"/>
-              <a:t>04.01.2013</a:t>
+              <a:t>07.01.2013</a:t>
             </a:fld>
             <a:endParaRPr lang="de-DE"/>
           </a:p>
@@ -3450,7 +3450,7 @@
           <a:p>
             <a:fld id="{6C6AE60A-B69C-4790-82F7-3882EDF23186}" type="slidenum">
               <a:rPr lang="de-DE" smtClean="0"/>
-              <a:t>‹Nr.›</a:t>
+              <a:t>‹#›</a:t>
             </a:fld>
             <a:endParaRPr lang="de-DE"/>
           </a:p>
@@ -3656,7 +3656,7 @@
           <a:p>
             <a:fld id="{1BA50D42-C9CD-4801-B293-61D1F53EC57E}" type="datetimeFigureOut">
               <a:rPr lang="de-DE" smtClean="0"/>
-              <a:t>04.01.2013</a:t>
+              <a:t>07.01.2013</a:t>
             </a:fld>
             <a:endParaRPr lang="de-DE"/>
           </a:p>
@@ -3698,7 +3698,7 @@
           <a:p>
             <a:fld id="{6C6AE60A-B69C-4790-82F7-3882EDF23186}" type="slidenum">
               <a:rPr lang="de-DE" smtClean="0"/>
-              <a:t>‹Nr.›</a:t>
+              <a:t>‹#›</a:t>
             </a:fld>
             <a:endParaRPr lang="de-DE"/>
           </a:p>
@@ -3885,7 +3885,7 @@
           <a:p>
             <a:fld id="{1BA50D42-C9CD-4801-B293-61D1F53EC57E}" type="datetimeFigureOut">
               <a:rPr lang="de-DE" smtClean="0"/>
-              <a:t>04.01.2013</a:t>
+              <a:t>07.01.2013</a:t>
             </a:fld>
             <a:endParaRPr lang="de-DE"/>
           </a:p>
@@ -3963,7 +3963,7 @@
           <a:p>
             <a:fld id="{6C6AE60A-B69C-4790-82F7-3882EDF23186}" type="slidenum">
               <a:rPr lang="de-DE" smtClean="0"/>
-              <a:t>‹Nr.›</a:t>
+              <a:t>‹#›</a:t>
             </a:fld>
             <a:endParaRPr lang="de-DE"/>
           </a:p>
@@ -4316,25 +4316,6 @@
           </a:p>
         </p:txBody>
       </p:sp>
-      <p:sp>
-        <p:nvSpPr>
-          <p:cNvPr id="3" name="Untertitel 2"/>
-          <p:cNvSpPr>
-            <a:spLocks noGrp="1"/>
-          </p:cNvSpPr>
-          <p:nvPr>
-            <p:ph type="subTitle" idx="1"/>
-          </p:nvPr>
-        </p:nvSpPr>
-        <p:spPr/>
-        <p:txBody>
-          <a:bodyPr/>
-          <a:lstStyle/>
-          <a:p>
-            <a:endParaRPr lang="de-CH"/>
-          </a:p>
-        </p:txBody>
-      </p:sp>
       <p:pic>
         <p:nvPicPr>
           <p:cNvPr id="4" name="Grafik 3"/>
@@ -5056,13 +5037,8 @@
             </a:r>
             <a:r>
               <a:rPr lang="de-CH" dirty="0" smtClean="0"/>
-              <a:t>-  und </a:t>
-            </a:r>
-            <a:r>
-              <a:rPr lang="de-CH" dirty="0" smtClean="0"/>
-              <a:t>Desktop-Apps</a:t>
-            </a:r>
-            <a:endParaRPr lang="de-CH" dirty="0" smtClean="0"/>
+              <a:t>-  und Desktop-Apps</a:t>
+            </a:r>
           </a:p>
           <a:p>
             <a:endParaRPr lang="de-CH" dirty="0" smtClean="0"/>
@@ -5974,25 +5950,7 @@
                           <a:ea typeface="Calibri"/>
                           <a:cs typeface="Times New Roman"/>
                         </a:rPr>
-                        <a:t>Viele </a:t>
-                      </a:r>
-                      <a:r>
-                        <a:rPr lang="de-CH" sz="1800" dirty="0" smtClean="0">
-                          <a:effectLst/>
-                          <a:latin typeface="Calibri"/>
-                          <a:ea typeface="Calibri"/>
-                          <a:cs typeface="Times New Roman"/>
-                        </a:rPr>
-                        <a:t>vorhanden</a:t>
-                      </a:r>
-                      <a:r>
-                        <a:rPr lang="de-CH" sz="1800" dirty="0" smtClean="0">
-                          <a:effectLst/>
-                          <a:latin typeface="Calibri"/>
-                          <a:ea typeface="Calibri"/>
-                          <a:cs typeface="Times New Roman"/>
-                        </a:rPr>
-                        <a:t>, Buch, Wiki, Overhead</a:t>
+                        <a:t>Viele vorhanden, Buch, Wiki, Overhead</a:t>
                       </a:r>
                       <a:endParaRPr lang="de-CH" sz="1800" dirty="0">
                         <a:effectLst/>
@@ -7158,11 +7116,7 @@
           <a:p>
             <a:r>
               <a:rPr lang="de-CH" dirty="0" smtClean="0"/>
-              <a:t>Evaluation </a:t>
-            </a:r>
-            <a:r>
-              <a:rPr lang="de-CH" dirty="0" smtClean="0"/>
-              <a:t>der Frameworks</a:t>
+              <a:t>Evaluation der Frameworks</a:t>
             </a:r>
           </a:p>
           <a:p>
@@ -7239,13 +7193,8 @@
             </a:r>
             <a:r>
               <a:rPr lang="de-CH" dirty="0" smtClean="0"/>
-              <a:t> Mobile, </a:t>
-            </a:r>
-            <a:r>
-              <a:rPr lang="de-CH" dirty="0" smtClean="0"/>
-              <a:t>PhoneGap</a:t>
-            </a:r>
-            <a:endParaRPr lang="de-CH" dirty="0" smtClean="0"/>
+              <a:t> Mobile, PhoneGap</a:t>
+            </a:r>
           </a:p>
         </p:txBody>
       </p:sp>
@@ -9449,11 +9398,7 @@
                     <a:p>
                       <a:r>
                         <a:rPr lang="de-CH" dirty="0" smtClean="0"/>
-                        <a:t>Manuell, </a:t>
-                      </a:r>
-                      <a:r>
-                        <a:rPr lang="de-CH" dirty="0" smtClean="0"/>
-                        <a:t>Jasmine-Framework (extern)</a:t>
+                        <a:t>Manuell, Jasmine-Framework (extern)</a:t>
                       </a:r>
                       <a:endParaRPr lang="de-CH" dirty="0"/>
                     </a:p>
@@ -10382,15 +10327,7 @@
             </a:r>
             <a:r>
               <a:rPr lang="de-CH" dirty="0" smtClean="0"/>
-              <a:t> wird </a:t>
-            </a:r>
-            <a:r>
-              <a:rPr lang="de-CH" dirty="0" smtClean="0"/>
-              <a:t>PhoneGap </a:t>
-            </a:r>
-            <a:r>
-              <a:rPr lang="de-CH" dirty="0" smtClean="0"/>
-              <a:t>empfohlen</a:t>
+              <a:t> wird PhoneGap empfohlen</a:t>
             </a:r>
             <a:endParaRPr lang="de-CH" dirty="0"/>
           </a:p>
@@ -11123,15 +11060,7 @@
                     <a:p>
                       <a:r>
                         <a:rPr lang="de-CH" dirty="0" smtClean="0"/>
-                        <a:t>Keiner, </a:t>
-                      </a:r>
-                      <a:r>
-                        <a:rPr lang="de-CH" dirty="0" smtClean="0"/>
-                        <a:t>PhoneGap </a:t>
-                      </a:r>
-                      <a:r>
-                        <a:rPr lang="de-CH" dirty="0" smtClean="0"/>
-                        <a:t>wird empfohlen</a:t>
+                        <a:t>Keiner, PhoneGap wird empfohlen</a:t>
                       </a:r>
                       <a:endParaRPr lang="de-CH" dirty="0"/>
                     </a:p>
@@ -11568,32 +11497,6 @@
               <a:rPr lang="de-CH" dirty="0" err="1" smtClean="0"/>
               <a:t>is</a:t>
             </a:r>
-            <a:endParaRPr lang="de-CH" dirty="0"/>
-          </a:p>
-        </p:txBody>
-      </p:sp>
-      <p:sp>
-        <p:nvSpPr>
-          <p:cNvPr id="3" name="Inhaltsplatzhalter 2"/>
-          <p:cNvSpPr>
-            <a:spLocks noGrp="1"/>
-          </p:cNvSpPr>
-          <p:nvPr>
-            <p:ph idx="1"/>
-          </p:nvPr>
-        </p:nvSpPr>
-        <p:spPr>
-          <a:xfrm>
-            <a:off x="457200" y="1600200"/>
-            <a:ext cx="8507288" cy="4525963"/>
-          </a:xfrm>
-        </p:spPr>
-        <p:txBody>
-          <a:bodyPr>
-            <a:normAutofit/>
-          </a:bodyPr>
-          <a:lstStyle/>
-          <a:p>
             <a:endParaRPr lang="de-CH" dirty="0"/>
           </a:p>
         </p:txBody>
@@ -12153,7 +12056,6 @@
               <a:rPr lang="de-CH" dirty="0" smtClean="0"/>
               <a:t>Lupen-App</a:t>
             </a:r>
-            <a:endParaRPr lang="de-CH" dirty="0" smtClean="0"/>
           </a:p>
           <a:p>
             <a:pPr lvl="1"/>
@@ -12603,11 +12505,7 @@
             <a:pPr lvl="1"/>
             <a:r>
               <a:rPr lang="de-CH" dirty="0" smtClean="0"/>
-              <a:t>In Landessprache verfügb</a:t>
-            </a:r>
-            <a:r>
-              <a:rPr lang="de-CH" dirty="0" smtClean="0"/>
-              <a:t>ar</a:t>
+              <a:t>In Landessprache verfügbar</a:t>
             </a:r>
           </a:p>
           <a:p>
@@ -14088,7 +13986,6 @@
               <a:rPr lang="de-CH" dirty="0" smtClean="0"/>
               <a:t>PhoneGap</a:t>
             </a:r>
-            <a:endParaRPr lang="de-CH" dirty="0" smtClean="0"/>
           </a:p>
           <a:p>
             <a:pPr lvl="1"/>
@@ -14160,25 +14057,6 @@
               <a:t>Lupen-Applikation - Demo</a:t>
             </a:r>
             <a:endParaRPr lang="de-CH" dirty="0"/>
-          </a:p>
-        </p:txBody>
-      </p:sp>
-      <p:sp>
-        <p:nvSpPr>
-          <p:cNvPr id="3" name="Inhaltsplatzhalter 2"/>
-          <p:cNvSpPr>
-            <a:spLocks noGrp="1"/>
-          </p:cNvSpPr>
-          <p:nvPr>
-            <p:ph idx="1"/>
-          </p:nvPr>
-        </p:nvSpPr>
-        <p:spPr/>
-        <p:txBody>
-          <a:bodyPr/>
-          <a:lstStyle/>
-          <a:p>
-            <a:endParaRPr lang="de-CH" dirty="0" smtClean="0"/>
           </a:p>
         </p:txBody>
       </p:sp>
@@ -14311,13 +14189,8 @@
           <a:p>
             <a:r>
               <a:rPr lang="de-CH" dirty="0" smtClean="0"/>
-              <a:t>Native Kamera-Ansteuerung: </a:t>
-            </a:r>
-            <a:r>
-              <a:rPr lang="de-CH" dirty="0" smtClean="0"/>
-              <a:t>PhoneGap</a:t>
-            </a:r>
-            <a:endParaRPr lang="de-CH" dirty="0" smtClean="0"/>
+              <a:t>Native Kamera-Ansteuerung: PhoneGap</a:t>
+            </a:r>
           </a:p>
           <a:p>
             <a:endParaRPr lang="de-CH" dirty="0"/>
@@ -14408,11 +14281,7 @@
           <a:p>
             <a:r>
               <a:rPr lang="de-CH" dirty="0" smtClean="0"/>
-              <a:t>Lupen-App </a:t>
-            </a:r>
-            <a:r>
-              <a:rPr lang="de-CH" dirty="0" smtClean="0"/>
-              <a:t>– Kamera-Ansteuerung</a:t>
+              <a:t>Lupen-App – Kamera-Ansteuerung</a:t>
             </a:r>
             <a:endParaRPr lang="de-CH" dirty="0"/>
           </a:p>
@@ -15035,11 +14904,7 @@
           <a:p>
             <a:r>
               <a:rPr lang="de-CH" dirty="0" smtClean="0"/>
-              <a:t>Lupen-App </a:t>
-            </a:r>
-            <a:r>
-              <a:rPr lang="de-CH" dirty="0" smtClean="0"/>
-              <a:t>– Bild auslesen</a:t>
+              <a:t>Lupen-App – Bild auslesen</a:t>
             </a:r>
             <a:endParaRPr lang="de-CH" dirty="0"/>
           </a:p>
@@ -15997,11 +15862,7 @@
           <a:p>
             <a:r>
               <a:rPr lang="de-CH" dirty="0" smtClean="0"/>
-              <a:t>Lupen-App </a:t>
-            </a:r>
-            <a:r>
-              <a:rPr lang="de-CH" dirty="0" smtClean="0"/>
-              <a:t>– Layout</a:t>
+              <a:t>Lupen-App – Layout</a:t>
             </a:r>
             <a:endParaRPr lang="de-CH" dirty="0"/>
           </a:p>
@@ -16649,11 +16510,7 @@
           <a:p>
             <a:r>
               <a:rPr lang="de-CH" dirty="0" smtClean="0"/>
-              <a:t>Lupen-App </a:t>
-            </a:r>
-            <a:r>
-              <a:rPr lang="de-CH" dirty="0" smtClean="0"/>
-              <a:t>– Verwendung von Loupe.js</a:t>
+              <a:t>Lupen-App – Verwendung von Loupe.js</a:t>
             </a:r>
             <a:endParaRPr lang="de-CH" dirty="0"/>
           </a:p>

</xml_diff>